<commit_message>
Day 24 content added
</commit_message>
<xml_diff>
--- a/Day24/DockerAndKubernetes_Training-Day24.pptx
+++ b/Day24/DockerAndKubernetes_Training-Day24.pptx
@@ -13660,7 +13660,7 @@
           <a:p>
             <a:r>
               <a:rPr lang="en-US" sz="4800" b="1" i="1" dirty="0"/>
-              <a:t>DAY 23</a:t>
+              <a:t>DAY 24</a:t>
             </a:r>
             <a:endParaRPr lang="en-IN" sz="4800" b="1" i="1" dirty="0"/>
           </a:p>
@@ -14066,9 +14066,74 @@
               <a:buChar char="Ø"/>
             </a:pPr>
             <a:r>
-              <a:rPr lang="en-US"/>
-              <a:t>PODs understanding</a:t>
+              <a:rPr lang="en-US" dirty="0" err="1"/>
+              <a:t>ContainerD</a:t>
             </a:r>
+            <a:r>
+              <a:rPr lang="en-US" dirty="0"/>
+              <a:t> understanding/installation steps</a:t>
+            </a:r>
+          </a:p>
+          <a:p>
+            <a:pPr lvl="1">
+              <a:buFont typeface="Wingdings" panose="05000000000000000000" pitchFamily="2" charset="2"/>
+              <a:buChar char="Ø"/>
+            </a:pPr>
+            <a:r>
+              <a:rPr lang="en-US" dirty="0"/>
+              <a:t>Kubernetes Course contents</a:t>
+            </a:r>
+          </a:p>
+          <a:p>
+            <a:pPr lvl="1">
+              <a:buFont typeface="Wingdings" panose="05000000000000000000" pitchFamily="2" charset="2"/>
+              <a:buChar char="Ø"/>
+            </a:pPr>
+            <a:r>
+              <a:rPr lang="en-US" dirty="0"/>
+              <a:t>API Details</a:t>
+            </a:r>
+          </a:p>
+          <a:p>
+            <a:pPr lvl="2">
+              <a:buFont typeface="Wingdings" panose="05000000000000000000" pitchFamily="2" charset="2"/>
+              <a:buChar char="Ø"/>
+            </a:pPr>
+            <a:r>
+              <a:rPr lang="en-US" dirty="0">
+                <a:hlinkClick r:id="rId2"/>
+              </a:rPr>
+              <a:t>https://kubernetes.io/docs/reference/using-api/</a:t>
+            </a:r>
+            <a:endParaRPr lang="en-US" dirty="0"/>
+          </a:p>
+          <a:p>
+            <a:pPr lvl="2">
+              <a:buFont typeface="Wingdings" panose="05000000000000000000" pitchFamily="2" charset="2"/>
+              <a:buChar char="Ø"/>
+            </a:pPr>
+            <a:r>
+              <a:rPr lang="en-US" dirty="0">
+                <a:hlinkClick r:id="rId3"/>
+              </a:rPr>
+              <a:t>https://kubernetes.io/docs/reference/generated/kubernetes-api/v1.21/</a:t>
+            </a:r>
+            <a:endParaRPr lang="en-US" dirty="0"/>
+          </a:p>
+          <a:p>
+            <a:pPr lvl="1">
+              <a:buFont typeface="Wingdings" panose="05000000000000000000" pitchFamily="2" charset="2"/>
+              <a:buChar char="Ø"/>
+            </a:pPr>
+            <a:r>
+              <a:rPr lang="en-US" dirty="0"/>
+              <a:t>Starting point - Pods</a:t>
+            </a:r>
+          </a:p>
+          <a:p>
+            <a:pPr marL="457200" lvl="1" indent="0">
+              <a:buNone/>
+            </a:pPr>
             <a:endParaRPr lang="en-US" dirty="0"/>
           </a:p>
           <a:p>

</xml_diff>

<commit_message>
Day 25 content updated
</commit_message>
<xml_diff>
--- a/Day24/DockerAndKubernetes_Training-Day24.pptx
+++ b/Day24/DockerAndKubernetes_Training-Day24.pptx
@@ -199,7 +199,7 @@
           <a:p>
             <a:fld id="{B09F413D-6E72-4B8A-80ED-A580F7C91B71}" type="datetimeFigureOut">
               <a:rPr lang="en-IN" smtClean="0"/>
-              <a:t>08-05-2023</a:t>
+              <a:t>09-05-2023</a:t>
             </a:fld>
             <a:endParaRPr lang="en-IN"/>
           </a:p>
@@ -802,7 +802,7 @@
           <a:p>
             <a:fld id="{12E8600E-B0EE-4521-BF40-4B72FBA06775}" type="datetimeFigureOut">
               <a:rPr lang="en-IN" smtClean="0"/>
-              <a:t>08-05-2023</a:t>
+              <a:t>09-05-2023</a:t>
             </a:fld>
             <a:endParaRPr lang="en-IN"/>
           </a:p>
@@ -1891,7 +1891,7 @@
             <a:fld id="{49F3E739-D457-46E5-B626-C9B182A007EE}" type="datetimeFigureOut">
               <a:rPr lang="en-US" smtClean="0"/>
               <a:pPr/>
-              <a:t>5/8/2023</a:t>
+              <a:t>5/9/2023</a:t>
             </a:fld>
             <a:endParaRPr lang="en-US"/>
           </a:p>
@@ -2873,7 +2873,7 @@
             <a:fld id="{49F3E739-D457-46E5-B626-C9B182A007EE}" type="datetimeFigureOut">
               <a:rPr lang="en-US" smtClean="0"/>
               <a:pPr/>
-              <a:t>5/8/2023</a:t>
+              <a:t>5/9/2023</a:t>
             </a:fld>
             <a:endParaRPr lang="en-US"/>
           </a:p>
@@ -4009,7 +4009,7 @@
             <a:fld id="{49F3E739-D457-46E5-B626-C9B182A007EE}" type="datetimeFigureOut">
               <a:rPr lang="en-US" smtClean="0"/>
               <a:pPr/>
-              <a:t>5/8/2023</a:t>
+              <a:t>5/9/2023</a:t>
             </a:fld>
             <a:endParaRPr lang="en-US"/>
           </a:p>
@@ -5044,7 +5044,7 @@
             <a:fld id="{49F3E739-D457-46E5-B626-C9B182A007EE}" type="datetimeFigureOut">
               <a:rPr lang="en-US" smtClean="0"/>
               <a:pPr/>
-              <a:t>5/8/2023</a:t>
+              <a:t>5/9/2023</a:t>
             </a:fld>
             <a:endParaRPr lang="en-US"/>
           </a:p>
@@ -5706,7 +5706,7 @@
             <a:fld id="{49F3E739-D457-46E5-B626-C9B182A007EE}" type="datetimeFigureOut">
               <a:rPr lang="en-US" smtClean="0"/>
               <a:pPr/>
-              <a:t>5/8/2023</a:t>
+              <a:t>5/9/2023</a:t>
             </a:fld>
             <a:endParaRPr lang="en-US"/>
           </a:p>
@@ -6569,7 +6569,7 @@
             <a:fld id="{49F3E739-D457-46E5-B626-C9B182A007EE}" type="datetimeFigureOut">
               <a:rPr lang="en-US" smtClean="0"/>
               <a:pPr/>
-              <a:t>5/8/2023</a:t>
+              <a:t>5/9/2023</a:t>
             </a:fld>
             <a:endParaRPr lang="en-US"/>
           </a:p>
@@ -6760,7 +6760,7 @@
           <a:p>
             <a:fld id="{12E8600E-B0EE-4521-BF40-4B72FBA06775}" type="datetimeFigureOut">
               <a:rPr lang="en-IN" smtClean="0"/>
-              <a:t>08-05-2023</a:t>
+              <a:t>09-05-2023</a:t>
             </a:fld>
             <a:endParaRPr lang="en-IN"/>
           </a:p>
@@ -7732,7 +7732,7 @@
           <a:p>
             <a:fld id="{12E8600E-B0EE-4521-BF40-4B72FBA06775}" type="datetimeFigureOut">
               <a:rPr lang="en-IN" smtClean="0"/>
-              <a:t>08-05-2023</a:t>
+              <a:t>09-05-2023</a:t>
             </a:fld>
             <a:endParaRPr lang="en-IN"/>
           </a:p>
@@ -7943,7 +7943,7 @@
           <a:p>
             <a:fld id="{12E8600E-B0EE-4521-BF40-4B72FBA06775}" type="datetimeFigureOut">
               <a:rPr lang="en-IN" smtClean="0"/>
-              <a:t>08-05-2023</a:t>
+              <a:t>09-05-2023</a:t>
             </a:fld>
             <a:endParaRPr lang="en-IN"/>
           </a:p>
@@ -8977,7 +8977,7 @@
           <a:p>
             <a:fld id="{12E8600E-B0EE-4521-BF40-4B72FBA06775}" type="datetimeFigureOut">
               <a:rPr lang="en-IN" smtClean="0"/>
-              <a:t>08-05-2023</a:t>
+              <a:t>09-05-2023</a:t>
             </a:fld>
             <a:endParaRPr lang="en-IN"/>
           </a:p>
@@ -9249,7 +9249,7 @@
           <a:p>
             <a:fld id="{12E8600E-B0EE-4521-BF40-4B72FBA06775}" type="datetimeFigureOut">
               <a:rPr lang="en-IN" smtClean="0"/>
-              <a:t>08-05-2023</a:t>
+              <a:t>09-05-2023</a:t>
             </a:fld>
             <a:endParaRPr lang="en-IN"/>
           </a:p>
@@ -9660,7 +9660,7 @@
             <a:fld id="{49F3E739-D457-46E5-B626-C9B182A007EE}" type="datetimeFigureOut">
               <a:rPr lang="en-US" smtClean="0"/>
               <a:pPr/>
-              <a:t>5/8/2023</a:t>
+              <a:t>5/9/2023</a:t>
             </a:fld>
             <a:endParaRPr lang="en-US"/>
           </a:p>
@@ -9788,7 +9788,7 @@
           <a:p>
             <a:fld id="{12E8600E-B0EE-4521-BF40-4B72FBA06775}" type="datetimeFigureOut">
               <a:rPr lang="en-IN" smtClean="0"/>
-              <a:t>08-05-2023</a:t>
+              <a:t>09-05-2023</a:t>
             </a:fld>
             <a:endParaRPr lang="en-IN"/>
           </a:p>
@@ -9883,7 +9883,7 @@
           <a:p>
             <a:fld id="{12E8600E-B0EE-4521-BF40-4B72FBA06775}" type="datetimeFigureOut">
               <a:rPr lang="en-IN" smtClean="0"/>
-              <a:t>08-05-2023</a:t>
+              <a:t>09-05-2023</a:t>
             </a:fld>
             <a:endParaRPr lang="en-IN"/>
           </a:p>
@@ -10964,7 +10964,7 @@
           <a:p>
             <a:fld id="{12E8600E-B0EE-4521-BF40-4B72FBA06775}" type="datetimeFigureOut">
               <a:rPr lang="en-IN" smtClean="0"/>
-              <a:t>08-05-2023</a:t>
+              <a:t>09-05-2023</a:t>
             </a:fld>
             <a:endParaRPr lang="en-IN"/>
           </a:p>
@@ -12073,7 +12073,7 @@
             <a:fld id="{49F3E739-D457-46E5-B626-C9B182A007EE}" type="datetimeFigureOut">
               <a:rPr lang="en-US" smtClean="0"/>
               <a:pPr/>
-              <a:t>5/8/2023</a:t>
+              <a:t>5/9/2023</a:t>
             </a:fld>
             <a:endParaRPr lang="en-US"/>
           </a:p>
@@ -13072,7 +13072,7 @@
             <a:fld id="{49F3E739-D457-46E5-B626-C9B182A007EE}" type="datetimeFigureOut">
               <a:rPr lang="en-US" smtClean="0"/>
               <a:pPr/>
-              <a:t>5/8/2023</a:t>
+              <a:t>5/9/2023</a:t>
             </a:fld>
             <a:endParaRPr lang="en-US"/>
           </a:p>
@@ -14057,6 +14057,16 @@
             </a:pPr>
             <a:r>
               <a:rPr lang="en-US" dirty="0"/>
+              <a:t>Kubernetes Networking</a:t>
+            </a:r>
+          </a:p>
+          <a:p>
+            <a:pPr lvl="1">
+              <a:buFont typeface="Wingdings" panose="05000000000000000000" pitchFamily="2" charset="2"/>
+              <a:buChar char="Ø"/>
+            </a:pPr>
+            <a:r>
+              <a:rPr lang="en-US" dirty="0"/>
               <a:t>Container Network Interfaces</a:t>
             </a:r>
           </a:p>
@@ -14119,16 +14129,6 @@
               <a:t>https://kubernetes.io/docs/reference/generated/kubernetes-api/v1.21/</a:t>
             </a:r>
             <a:endParaRPr lang="en-US" dirty="0"/>
-          </a:p>
-          <a:p>
-            <a:pPr lvl="1">
-              <a:buFont typeface="Wingdings" panose="05000000000000000000" pitchFamily="2" charset="2"/>
-              <a:buChar char="Ø"/>
-            </a:pPr>
-            <a:r>
-              <a:rPr lang="en-US" dirty="0"/>
-              <a:t>Starting point - Pods</a:t>
-            </a:r>
           </a:p>
           <a:p>
             <a:pPr marL="457200" lvl="1" indent="0">

</xml_diff>